<commit_message>
mein name hat gefehlt
</commit_message>
<xml_diff>
--- a/Gesundheit!_Präsentation.pptx
+++ b/Gesundheit!_Präsentation.pptx
@@ -1,6 +1,6 @@
 
 <file path=ppt/presentation.xml><?xml version="1.0" encoding="utf-8"?>
-<p:presentation xmlns:a="http://schemas.openxmlformats.org/drawingml/2006/main" xmlns:r="http://schemas.openxmlformats.org/officeDocument/2006/relationships" xmlns:p="http://schemas.openxmlformats.org/presentationml/2006/main" autoCompressPictures="0">
+<p:presentation xmlns:a="http://schemas.openxmlformats.org/drawingml/2006/main" xmlns:r="http://schemas.openxmlformats.org/officeDocument/2006/relationships" xmlns:mc="http://schemas.openxmlformats.org/markup-compatibility/2006" xmlns:mv="urn:schemas-microsoft-com:mac:vml" xmlns:p="http://schemas.openxmlformats.org/presentationml/2006/main" mc:Ignorable="mv" mc:PreserveAttributes="mv:*" autoCompressPictures="0">
   <p:sldMasterIdLst>
     <p:sldMasterId id="2147483648" r:id="rId1"/>
   </p:sldMasterIdLst>
@@ -109,7 +109,7 @@
 </file>
 
 <file path=ppt/slideLayouts/slideLayout1.xml><?xml version="1.0" encoding="utf-8"?>
-<p:sldLayout xmlns:a="http://schemas.openxmlformats.org/drawingml/2006/main" xmlns:r="http://schemas.openxmlformats.org/officeDocument/2006/relationships" xmlns:p="http://schemas.openxmlformats.org/presentationml/2006/main" showMasterSp="0" type="title" preserve="1">
+<p:sldLayout xmlns:a="http://schemas.openxmlformats.org/drawingml/2006/main" xmlns:r="http://schemas.openxmlformats.org/officeDocument/2006/relationships" xmlns:mc="http://schemas.openxmlformats.org/markup-compatibility/2006" xmlns:mv="urn:schemas-microsoft-com:mac:vml" xmlns:p="http://schemas.openxmlformats.org/presentationml/2006/main" mc:Ignorable="mv" mc:PreserveAttributes="mv:*" showMasterSp="0" type="title" preserve="1">
   <p:cSld name="Titelfolie">
     <p:spTree>
       <p:nvGrpSpPr>
@@ -300,7 +300,7 @@
             <a:fld id="{B61BEF0D-F0BB-DE4B-95CE-6DB70DBA9567}" type="datetimeFigureOut">
               <a:rPr lang="en-US" dirty="0"/>
               <a:pPr/>
-              <a:t>6/12/2016</a:t>
+              <a:t>12.06.2016</a:t>
             </a:fld>
             <a:endParaRPr lang="en-US" dirty="0"/>
           </a:p>
@@ -533,7 +533,7 @@
 </file>
 
 <file path=ppt/slideLayouts/slideLayout10.xml><?xml version="1.0" encoding="utf-8"?>
-<p:sldLayout xmlns:a="http://schemas.openxmlformats.org/drawingml/2006/main" xmlns:r="http://schemas.openxmlformats.org/officeDocument/2006/relationships" xmlns:p="http://schemas.openxmlformats.org/presentationml/2006/main" preserve="1">
+<p:sldLayout xmlns:a="http://schemas.openxmlformats.org/drawingml/2006/main" xmlns:r="http://schemas.openxmlformats.org/officeDocument/2006/relationships" xmlns:mc="http://schemas.openxmlformats.org/markup-compatibility/2006" xmlns:mv="urn:schemas-microsoft-com:mac:vml" xmlns:p="http://schemas.openxmlformats.org/presentationml/2006/main" mc:Ignorable="mv" mc:PreserveAttributes="mv:*" preserve="1">
   <p:cSld name="Panoramabild mit Beschriftung">
     <p:spTree>
       <p:nvGrpSpPr>
@@ -733,7 +733,7 @@
             <a:fld id="{B61BEF0D-F0BB-DE4B-95CE-6DB70DBA9567}" type="datetimeFigureOut">
               <a:rPr lang="en-US" dirty="0"/>
               <a:pPr/>
-              <a:t>6/12/2016</a:t>
+              <a:t>12.06.2016</a:t>
             </a:fld>
             <a:endParaRPr lang="en-US" dirty="0"/>
           </a:p>
@@ -791,7 +791,7 @@
 </file>
 
 <file path=ppt/slideLayouts/slideLayout11.xml><?xml version="1.0" encoding="utf-8"?>
-<p:sldLayout xmlns:a="http://schemas.openxmlformats.org/drawingml/2006/main" xmlns:r="http://schemas.openxmlformats.org/officeDocument/2006/relationships" xmlns:p="http://schemas.openxmlformats.org/presentationml/2006/main" preserve="1">
+<p:sldLayout xmlns:a="http://schemas.openxmlformats.org/drawingml/2006/main" xmlns:r="http://schemas.openxmlformats.org/officeDocument/2006/relationships" xmlns:mc="http://schemas.openxmlformats.org/markup-compatibility/2006" xmlns:mv="urn:schemas-microsoft-com:mac:vml" xmlns:p="http://schemas.openxmlformats.org/presentationml/2006/main" mc:Ignorable="mv" mc:PreserveAttributes="mv:*" preserve="1">
   <p:cSld name="Titel und Beschriftung">
     <p:spTree>
       <p:nvGrpSpPr>
@@ -980,7 +980,7 @@
             <a:fld id="{B61BEF0D-F0BB-DE4B-95CE-6DB70DBA9567}" type="datetimeFigureOut">
               <a:rPr lang="en-US" dirty="0"/>
               <a:pPr/>
-              <a:t>6/12/2016</a:t>
+              <a:t>12.06.2016</a:t>
             </a:fld>
             <a:endParaRPr lang="en-US" dirty="0"/>
           </a:p>
@@ -1038,7 +1038,7 @@
 </file>
 
 <file path=ppt/slideLayouts/slideLayout12.xml><?xml version="1.0" encoding="utf-8"?>
-<p:sldLayout xmlns:a="http://schemas.openxmlformats.org/drawingml/2006/main" xmlns:r="http://schemas.openxmlformats.org/officeDocument/2006/relationships" xmlns:p="http://schemas.openxmlformats.org/presentationml/2006/main" preserve="1">
+<p:sldLayout xmlns:a="http://schemas.openxmlformats.org/drawingml/2006/main" xmlns:r="http://schemas.openxmlformats.org/officeDocument/2006/relationships" xmlns:mc="http://schemas.openxmlformats.org/markup-compatibility/2006" xmlns:mv="urn:schemas-microsoft-com:mac:vml" xmlns:p="http://schemas.openxmlformats.org/presentationml/2006/main" mc:Ignorable="mv" mc:PreserveAttributes="mv:*" preserve="1">
   <p:cSld name="Zitat mit Beschriftung">
     <p:spTree>
       <p:nvGrpSpPr>
@@ -1285,7 +1285,7 @@
             <a:fld id="{B61BEF0D-F0BB-DE4B-95CE-6DB70DBA9567}" type="datetimeFigureOut">
               <a:rPr lang="en-US" dirty="0"/>
               <a:pPr/>
-              <a:t>6/12/2016</a:t>
+              <a:t>12.06.2016</a:t>
             </a:fld>
             <a:endParaRPr lang="en-US" dirty="0"/>
           </a:p>
@@ -1411,7 +1411,7 @@
 </file>
 
 <file path=ppt/slideLayouts/slideLayout13.xml><?xml version="1.0" encoding="utf-8"?>
-<p:sldLayout xmlns:a="http://schemas.openxmlformats.org/drawingml/2006/main" xmlns:r="http://schemas.openxmlformats.org/officeDocument/2006/relationships" xmlns:p="http://schemas.openxmlformats.org/presentationml/2006/main" preserve="1">
+<p:sldLayout xmlns:a="http://schemas.openxmlformats.org/drawingml/2006/main" xmlns:r="http://schemas.openxmlformats.org/officeDocument/2006/relationships" xmlns:mc="http://schemas.openxmlformats.org/markup-compatibility/2006" xmlns:mv="urn:schemas-microsoft-com:mac:vml" xmlns:p="http://schemas.openxmlformats.org/presentationml/2006/main" mc:Ignorable="mv" mc:PreserveAttributes="mv:*" preserve="1">
   <p:cSld name="Namenskarte">
     <p:spTree>
       <p:nvGrpSpPr>
@@ -1600,7 +1600,7 @@
             <a:fld id="{B61BEF0D-F0BB-DE4B-95CE-6DB70DBA9567}" type="datetimeFigureOut">
               <a:rPr lang="en-US" dirty="0"/>
               <a:pPr/>
-              <a:t>6/12/2016</a:t>
+              <a:t>12.06.2016</a:t>
             </a:fld>
             <a:endParaRPr lang="en-US" dirty="0"/>
           </a:p>
@@ -1658,7 +1658,7 @@
 </file>
 
 <file path=ppt/slideLayouts/slideLayout14.xml><?xml version="1.0" encoding="utf-8"?>
-<p:sldLayout xmlns:a="http://schemas.openxmlformats.org/drawingml/2006/main" xmlns:r="http://schemas.openxmlformats.org/officeDocument/2006/relationships" xmlns:p="http://schemas.openxmlformats.org/presentationml/2006/main" preserve="1">
+<p:sldLayout xmlns:a="http://schemas.openxmlformats.org/drawingml/2006/main" xmlns:r="http://schemas.openxmlformats.org/officeDocument/2006/relationships" xmlns:mc="http://schemas.openxmlformats.org/markup-compatibility/2006" xmlns:mv="urn:schemas-microsoft-com:mac:vml" xmlns:p="http://schemas.openxmlformats.org/presentationml/2006/main" mc:Ignorable="mv" mc:PreserveAttributes="mv:*" preserve="1">
   <p:cSld name="Namenskarte für Zitat">
     <p:spTree>
       <p:nvGrpSpPr>
@@ -1899,7 +1899,7 @@
             <a:fld id="{B61BEF0D-F0BB-DE4B-95CE-6DB70DBA9567}" type="datetimeFigureOut">
               <a:rPr lang="en-US" dirty="0"/>
               <a:pPr/>
-              <a:t>6/12/2016</a:t>
+              <a:t>12.06.2016</a:t>
             </a:fld>
             <a:endParaRPr lang="en-US" dirty="0"/>
           </a:p>
@@ -2025,7 +2025,7 @@
 </file>
 
 <file path=ppt/slideLayouts/slideLayout15.xml><?xml version="1.0" encoding="utf-8"?>
-<p:sldLayout xmlns:a="http://schemas.openxmlformats.org/drawingml/2006/main" xmlns:r="http://schemas.openxmlformats.org/officeDocument/2006/relationships" xmlns:p="http://schemas.openxmlformats.org/presentationml/2006/main" preserve="1">
+<p:sldLayout xmlns:a="http://schemas.openxmlformats.org/drawingml/2006/main" xmlns:r="http://schemas.openxmlformats.org/officeDocument/2006/relationships" xmlns:mc="http://schemas.openxmlformats.org/markup-compatibility/2006" xmlns:mv="urn:schemas-microsoft-com:mac:vml" xmlns:p="http://schemas.openxmlformats.org/presentationml/2006/main" mc:Ignorable="mv" mc:PreserveAttributes="mv:*" preserve="1">
   <p:cSld name="Wahr oder Falsch">
     <p:spTree>
       <p:nvGrpSpPr>
@@ -2263,7 +2263,7 @@
             <a:fld id="{B61BEF0D-F0BB-DE4B-95CE-6DB70DBA9567}" type="datetimeFigureOut">
               <a:rPr lang="en-US" dirty="0"/>
               <a:pPr/>
-              <a:t>6/12/2016</a:t>
+              <a:t>12.06.2016</a:t>
             </a:fld>
             <a:endParaRPr lang="en-US" dirty="0"/>
           </a:p>
@@ -2321,7 +2321,7 @@
 </file>
 
 <file path=ppt/slideLayouts/slideLayout16.xml><?xml version="1.0" encoding="utf-8"?>
-<p:sldLayout xmlns:a="http://schemas.openxmlformats.org/drawingml/2006/main" xmlns:r="http://schemas.openxmlformats.org/officeDocument/2006/relationships" xmlns:p="http://schemas.openxmlformats.org/presentationml/2006/main" type="vertTx" preserve="1">
+<p:sldLayout xmlns:a="http://schemas.openxmlformats.org/drawingml/2006/main" xmlns:r="http://schemas.openxmlformats.org/officeDocument/2006/relationships" xmlns:mc="http://schemas.openxmlformats.org/markup-compatibility/2006" xmlns:mv="urn:schemas-microsoft-com:mac:vml" xmlns:p="http://schemas.openxmlformats.org/presentationml/2006/main" mc:Ignorable="mv" mc:PreserveAttributes="mv:*" type="vertTx" preserve="1">
   <p:cSld name="Titel und vertikaler Text">
     <p:spTree>
       <p:nvGrpSpPr>
@@ -2434,7 +2434,7 @@
             <a:fld id="{B61BEF0D-F0BB-DE4B-95CE-6DB70DBA9567}" type="datetimeFigureOut">
               <a:rPr lang="en-US" dirty="0"/>
               <a:pPr/>
-              <a:t>6/12/2016</a:t>
+              <a:t>12.06.2016</a:t>
             </a:fld>
             <a:endParaRPr lang="en-US" dirty="0"/>
           </a:p>
@@ -2492,7 +2492,7 @@
 </file>
 
 <file path=ppt/slideLayouts/slideLayout17.xml><?xml version="1.0" encoding="utf-8"?>
-<p:sldLayout xmlns:a="http://schemas.openxmlformats.org/drawingml/2006/main" xmlns:r="http://schemas.openxmlformats.org/officeDocument/2006/relationships" xmlns:p="http://schemas.openxmlformats.org/presentationml/2006/main" type="vertTitleAndTx" preserve="1">
+<p:sldLayout xmlns:a="http://schemas.openxmlformats.org/drawingml/2006/main" xmlns:r="http://schemas.openxmlformats.org/officeDocument/2006/relationships" xmlns:mc="http://schemas.openxmlformats.org/markup-compatibility/2006" xmlns:mv="urn:schemas-microsoft-com:mac:vml" xmlns:p="http://schemas.openxmlformats.org/presentationml/2006/main" mc:Ignorable="mv" mc:PreserveAttributes="mv:*" type="vertTitleAndTx" preserve="1">
   <p:cSld name="Vertikaler Titel und Text">
     <p:spTree>
       <p:nvGrpSpPr>
@@ -2611,7 +2611,7 @@
             <a:fld id="{B61BEF0D-F0BB-DE4B-95CE-6DB70DBA9567}" type="datetimeFigureOut">
               <a:rPr lang="en-US" dirty="0"/>
               <a:pPr/>
-              <a:t>6/12/2016</a:t>
+              <a:t>12.06.2016</a:t>
             </a:fld>
             <a:endParaRPr lang="en-US" dirty="0"/>
           </a:p>
@@ -2669,7 +2669,7 @@
 </file>
 
 <file path=ppt/slideLayouts/slideLayout2.xml><?xml version="1.0" encoding="utf-8"?>
-<p:sldLayout xmlns:a="http://schemas.openxmlformats.org/drawingml/2006/main" xmlns:r="http://schemas.openxmlformats.org/officeDocument/2006/relationships" xmlns:p="http://schemas.openxmlformats.org/presentationml/2006/main" type="obj" preserve="1">
+<p:sldLayout xmlns:a="http://schemas.openxmlformats.org/drawingml/2006/main" xmlns:r="http://schemas.openxmlformats.org/officeDocument/2006/relationships" xmlns:mc="http://schemas.openxmlformats.org/markup-compatibility/2006" xmlns:mv="urn:schemas-microsoft-com:mac:vml" xmlns:p="http://schemas.openxmlformats.org/presentationml/2006/main" mc:Ignorable="mv" mc:PreserveAttributes="mv:*" type="obj" preserve="1">
   <p:cSld name="Titel und Inhalt">
     <p:spTree>
       <p:nvGrpSpPr>
@@ -2778,7 +2778,7 @@
             <a:fld id="{B61BEF0D-F0BB-DE4B-95CE-6DB70DBA9567}" type="datetimeFigureOut">
               <a:rPr lang="en-US" dirty="0"/>
               <a:pPr/>
-              <a:t>6/12/2016</a:t>
+              <a:t>12.06.2016</a:t>
             </a:fld>
             <a:endParaRPr lang="en-US" dirty="0"/>
           </a:p>
@@ -2836,7 +2836,7 @@
 </file>
 
 <file path=ppt/slideLayouts/slideLayout3.xml><?xml version="1.0" encoding="utf-8"?>
-<p:sldLayout xmlns:a="http://schemas.openxmlformats.org/drawingml/2006/main" xmlns:r="http://schemas.openxmlformats.org/officeDocument/2006/relationships" xmlns:p="http://schemas.openxmlformats.org/presentationml/2006/main" type="secHead" preserve="1">
+<p:sldLayout xmlns:a="http://schemas.openxmlformats.org/drawingml/2006/main" xmlns:r="http://schemas.openxmlformats.org/officeDocument/2006/relationships" xmlns:mc="http://schemas.openxmlformats.org/markup-compatibility/2006" xmlns:mv="urn:schemas-microsoft-com:mac:vml" xmlns:p="http://schemas.openxmlformats.org/presentationml/2006/main" mc:Ignorable="mv" mc:PreserveAttributes="mv:*" type="secHead" preserve="1">
   <p:cSld name="Abschnitts-&#10;überschrift">
     <p:spTree>
       <p:nvGrpSpPr>
@@ -3025,7 +3025,7 @@
             <a:fld id="{B61BEF0D-F0BB-DE4B-95CE-6DB70DBA9567}" type="datetimeFigureOut">
               <a:rPr lang="en-US" dirty="0"/>
               <a:pPr/>
-              <a:t>6/12/2016</a:t>
+              <a:t>12.06.2016</a:t>
             </a:fld>
             <a:endParaRPr lang="en-US" dirty="0"/>
           </a:p>
@@ -3083,7 +3083,7 @@
 </file>
 
 <file path=ppt/slideLayouts/slideLayout4.xml><?xml version="1.0" encoding="utf-8"?>
-<p:sldLayout xmlns:a="http://schemas.openxmlformats.org/drawingml/2006/main" xmlns:r="http://schemas.openxmlformats.org/officeDocument/2006/relationships" xmlns:p="http://schemas.openxmlformats.org/presentationml/2006/main" type="twoObj" preserve="1">
+<p:sldLayout xmlns:a="http://schemas.openxmlformats.org/drawingml/2006/main" xmlns:r="http://schemas.openxmlformats.org/officeDocument/2006/relationships" xmlns:mc="http://schemas.openxmlformats.org/markup-compatibility/2006" xmlns:mv="urn:schemas-microsoft-com:mac:vml" xmlns:p="http://schemas.openxmlformats.org/presentationml/2006/main" mc:Ignorable="mv" mc:PreserveAttributes="mv:*" type="twoObj" preserve="1">
   <p:cSld name="Zwei Inhalte">
     <p:spTree>
       <p:nvGrpSpPr>
@@ -3258,7 +3258,7 @@
             <a:fld id="{B61BEF0D-F0BB-DE4B-95CE-6DB70DBA9567}" type="datetimeFigureOut">
               <a:rPr lang="en-US" dirty="0"/>
               <a:pPr/>
-              <a:t>6/12/2016</a:t>
+              <a:t>12.06.2016</a:t>
             </a:fld>
             <a:endParaRPr lang="en-US" dirty="0"/>
           </a:p>
@@ -3316,7 +3316,7 @@
 </file>
 
 <file path=ppt/slideLayouts/slideLayout5.xml><?xml version="1.0" encoding="utf-8"?>
-<p:sldLayout xmlns:a="http://schemas.openxmlformats.org/drawingml/2006/main" xmlns:r="http://schemas.openxmlformats.org/officeDocument/2006/relationships" xmlns:p="http://schemas.openxmlformats.org/presentationml/2006/main" type="twoTxTwoObj" preserve="1">
+<p:sldLayout xmlns:a="http://schemas.openxmlformats.org/drawingml/2006/main" xmlns:r="http://schemas.openxmlformats.org/officeDocument/2006/relationships" xmlns:mc="http://schemas.openxmlformats.org/markup-compatibility/2006" xmlns:mv="urn:schemas-microsoft-com:mac:vml" xmlns:p="http://schemas.openxmlformats.org/presentationml/2006/main" mc:Ignorable="mv" mc:PreserveAttributes="mv:*" type="twoTxTwoObj" preserve="1">
   <p:cSld name="Vergleich">
     <p:spTree>
       <p:nvGrpSpPr>
@@ -3637,7 +3637,7 @@
             <a:fld id="{B61BEF0D-F0BB-DE4B-95CE-6DB70DBA9567}" type="datetimeFigureOut">
               <a:rPr lang="en-US" dirty="0"/>
               <a:pPr/>
-              <a:t>6/12/2016</a:t>
+              <a:t>12.06.2016</a:t>
             </a:fld>
             <a:endParaRPr lang="en-US" dirty="0"/>
           </a:p>
@@ -3695,7 +3695,7 @@
 </file>
 
 <file path=ppt/slideLayouts/slideLayout6.xml><?xml version="1.0" encoding="utf-8"?>
-<p:sldLayout xmlns:a="http://schemas.openxmlformats.org/drawingml/2006/main" xmlns:r="http://schemas.openxmlformats.org/officeDocument/2006/relationships" xmlns:p="http://schemas.openxmlformats.org/presentationml/2006/main" type="titleOnly" preserve="1">
+<p:sldLayout xmlns:a="http://schemas.openxmlformats.org/drawingml/2006/main" xmlns:r="http://schemas.openxmlformats.org/officeDocument/2006/relationships" xmlns:mc="http://schemas.openxmlformats.org/markup-compatibility/2006" xmlns:mv="urn:schemas-microsoft-com:mac:vml" xmlns:p="http://schemas.openxmlformats.org/presentationml/2006/main" mc:Ignorable="mv" mc:PreserveAttributes="mv:*" type="titleOnly" preserve="1">
   <p:cSld name="Nur Titel">
     <p:spTree>
       <p:nvGrpSpPr>
@@ -3752,7 +3752,7 @@
             <a:fld id="{B61BEF0D-F0BB-DE4B-95CE-6DB70DBA9567}" type="datetimeFigureOut">
               <a:rPr lang="en-US" dirty="0"/>
               <a:pPr/>
-              <a:t>6/12/2016</a:t>
+              <a:t>12.06.2016</a:t>
             </a:fld>
             <a:endParaRPr lang="en-US" dirty="0"/>
           </a:p>
@@ -3810,7 +3810,7 @@
 </file>
 
 <file path=ppt/slideLayouts/slideLayout7.xml><?xml version="1.0" encoding="utf-8"?>
-<p:sldLayout xmlns:a="http://schemas.openxmlformats.org/drawingml/2006/main" xmlns:r="http://schemas.openxmlformats.org/officeDocument/2006/relationships" xmlns:p="http://schemas.openxmlformats.org/presentationml/2006/main" type="blank" preserve="1">
+<p:sldLayout xmlns:a="http://schemas.openxmlformats.org/drawingml/2006/main" xmlns:r="http://schemas.openxmlformats.org/officeDocument/2006/relationships" xmlns:mc="http://schemas.openxmlformats.org/markup-compatibility/2006" xmlns:mv="urn:schemas-microsoft-com:mac:vml" xmlns:p="http://schemas.openxmlformats.org/presentationml/2006/main" mc:Ignorable="mv" mc:PreserveAttributes="mv:*" type="blank" preserve="1">
   <p:cSld name="Leer">
     <p:spTree>
       <p:nvGrpSpPr>
@@ -3844,7 +3844,7 @@
             <a:fld id="{B61BEF0D-F0BB-DE4B-95CE-6DB70DBA9567}" type="datetimeFigureOut">
               <a:rPr lang="en-US" dirty="0"/>
               <a:pPr/>
-              <a:t>6/12/2016</a:t>
+              <a:t>12.06.2016</a:t>
             </a:fld>
             <a:endParaRPr lang="en-US" dirty="0"/>
           </a:p>
@@ -3902,7 +3902,7 @@
 </file>
 
 <file path=ppt/slideLayouts/slideLayout8.xml><?xml version="1.0" encoding="utf-8"?>
-<p:sldLayout xmlns:a="http://schemas.openxmlformats.org/drawingml/2006/main" xmlns:r="http://schemas.openxmlformats.org/officeDocument/2006/relationships" xmlns:p="http://schemas.openxmlformats.org/presentationml/2006/main" type="objTx" preserve="1">
+<p:sldLayout xmlns:a="http://schemas.openxmlformats.org/drawingml/2006/main" xmlns:r="http://schemas.openxmlformats.org/officeDocument/2006/relationships" xmlns:mc="http://schemas.openxmlformats.org/markup-compatibility/2006" xmlns:mv="urn:schemas-microsoft-com:mac:vml" xmlns:p="http://schemas.openxmlformats.org/presentationml/2006/main" mc:Ignorable="mv" mc:PreserveAttributes="mv:*" type="objTx" preserve="1">
   <p:cSld name="Inhalt mit Überschrift">
     <p:spTree>
       <p:nvGrpSpPr>
@@ -4096,7 +4096,7 @@
             <a:fld id="{B61BEF0D-F0BB-DE4B-95CE-6DB70DBA9567}" type="datetimeFigureOut">
               <a:rPr lang="en-US" dirty="0"/>
               <a:pPr/>
-              <a:t>6/12/2016</a:t>
+              <a:t>12.06.2016</a:t>
             </a:fld>
             <a:endParaRPr lang="en-US" dirty="0"/>
           </a:p>
@@ -4154,7 +4154,7 @@
 </file>
 
 <file path=ppt/slideLayouts/slideLayout9.xml><?xml version="1.0" encoding="utf-8"?>
-<p:sldLayout xmlns:a="http://schemas.openxmlformats.org/drawingml/2006/main" xmlns:r="http://schemas.openxmlformats.org/officeDocument/2006/relationships" xmlns:p="http://schemas.openxmlformats.org/presentationml/2006/main" type="picTx" preserve="1">
+<p:sldLayout xmlns:a="http://schemas.openxmlformats.org/drawingml/2006/main" xmlns:r="http://schemas.openxmlformats.org/officeDocument/2006/relationships" xmlns:mc="http://schemas.openxmlformats.org/markup-compatibility/2006" xmlns:mv="urn:schemas-microsoft-com:mac:vml" xmlns:p="http://schemas.openxmlformats.org/presentationml/2006/main" mc:Ignorable="mv" mc:PreserveAttributes="mv:*" type="picTx" preserve="1">
   <p:cSld name="Bild mit Überschrift">
     <p:spTree>
       <p:nvGrpSpPr>
@@ -4376,7 +4376,7 @@
             <a:fld id="{B61BEF0D-F0BB-DE4B-95CE-6DB70DBA9567}" type="datetimeFigureOut">
               <a:rPr lang="en-US" dirty="0"/>
               <a:pPr/>
-              <a:t>6/12/2016</a:t>
+              <a:t>12.06.2016</a:t>
             </a:fld>
             <a:endParaRPr lang="en-US" dirty="0"/>
           </a:p>
@@ -4434,7 +4434,7 @@
 </file>
 
 <file path=ppt/slideMasters/slideMaster1.xml><?xml version="1.0" encoding="utf-8"?>
-<p:sldMaster xmlns:a="http://schemas.openxmlformats.org/drawingml/2006/main" xmlns:r="http://schemas.openxmlformats.org/officeDocument/2006/relationships" xmlns:p="http://schemas.openxmlformats.org/presentationml/2006/main">
+<p:sldMaster xmlns:a="http://schemas.openxmlformats.org/drawingml/2006/main" xmlns:r="http://schemas.openxmlformats.org/officeDocument/2006/relationships" xmlns:mc="http://schemas.openxmlformats.org/markup-compatibility/2006" xmlns:mv="urn:schemas-microsoft-com:mac:vml" xmlns:p="http://schemas.openxmlformats.org/presentationml/2006/main" mc:Ignorable="mv" mc:PreserveAttributes="mv:*">
   <p:cSld>
     <p:bg>
       <p:bgRef idx="1002">
@@ -4779,7 +4779,7 @@
             <a:fld id="{B61BEF0D-F0BB-DE4B-95CE-6DB70DBA9567}" type="datetimeFigureOut">
               <a:rPr lang="en-US" dirty="0"/>
               <a:pPr/>
-              <a:t>6/12/2016</a:t>
+              <a:t>12.06.2016</a:t>
             </a:fld>
             <a:endParaRPr lang="en-US" dirty="0"/>
           </a:p>
@@ -5294,7 +5294,7 @@
 </file>
 
 <file path=ppt/slides/slide1.xml><?xml version="1.0" encoding="utf-8"?>
-<p:sld xmlns:a="http://schemas.openxmlformats.org/drawingml/2006/main" xmlns:r="http://schemas.openxmlformats.org/officeDocument/2006/relationships" xmlns:p="http://schemas.openxmlformats.org/presentationml/2006/main">
+<p:sld xmlns:a="http://schemas.openxmlformats.org/drawingml/2006/main" xmlns:r="http://schemas.openxmlformats.org/officeDocument/2006/relationships" xmlns:mc="http://schemas.openxmlformats.org/markup-compatibility/2006" xmlns:mv="urn:schemas-microsoft-com:mac:vml" xmlns:p="http://schemas.openxmlformats.org/presentationml/2006/main" mc:Ignorable="mv" mc:PreserveAttributes="mv:*">
   <p:cSld>
     <p:spTree>
       <p:nvGrpSpPr>
@@ -5331,9 +5331,17 @@
           </a:bodyPr>
           <a:lstStyle/>
           <a:p>
+            <a:r>
+              <a:rPr lang="de-DE" dirty="0"/>
+              <a:t/>
+            </a:r>
             <a:br>
               <a:rPr lang="de-DE" dirty="0"/>
             </a:br>
+            <a:r>
+              <a:rPr lang="de-DE" dirty="0"/>
+              <a:t/>
+            </a:r>
             <a:br>
               <a:rPr lang="de-DE" dirty="0"/>
             </a:br>
@@ -5351,6 +5359,10 @@
               </a:rPr>
               <a:t>GESUNDHEIT!</a:t>
             </a:r>
+            <a:r>
+              <a:rPr lang="de-DE" dirty="0"/>
+              <a:t/>
+            </a:r>
             <a:br>
               <a:rPr lang="de-DE" dirty="0"/>
             </a:br>
@@ -5402,24 +5414,64 @@
               </a:rPr>
               <a:t>Pablo					Anna</a:t>
             </a:r>
-            <a:br>
-              <a:rPr lang="de-DE" dirty="0">
+            <a:r>
+              <a:rPr lang="de-DE" dirty="0" smtClean="0">
                 <a:solidFill>
                   <a:schemeClr val="tx1">
                     <a:lumMod val="85000"/>
                   </a:schemeClr>
                 </a:solidFill>
               </a:rPr>
-            </a:br>
-            <a:r>
-              <a:rPr lang="de-DE" dirty="0">
+              <a:t/>
+            </a:r>
+            <a:br>
+              <a:rPr lang="de-DE" dirty="0" smtClean="0">
                 <a:solidFill>
                   <a:schemeClr val="tx1">
                     <a:lumMod val="85000"/>
                   </a:schemeClr>
                 </a:solidFill>
               </a:rPr>
-              <a:t>„“						Paula</a:t>
+            </a:br>
+            <a:r>
+              <a:rPr lang="de-DE" dirty="0" smtClean="0">
+                <a:solidFill>
+                  <a:schemeClr val="tx1">
+                    <a:lumMod val="85000"/>
+                  </a:schemeClr>
+                </a:solidFill>
+              </a:rPr>
+              <a:t>Jonathan	</a:t>
+            </a:r>
+            <a:r>
+              <a:rPr lang="de-DE" dirty="0">
+                <a:solidFill>
+                  <a:schemeClr val="tx1">
+                    <a:lumMod val="85000"/>
+                  </a:schemeClr>
+                </a:solidFill>
+              </a:rPr>
+              <a:t>		</a:t>
+            </a:r>
+            <a:r>
+              <a:rPr lang="de-DE" dirty="0" smtClean="0">
+                <a:solidFill>
+                  <a:schemeClr val="tx1">
+                    <a:lumMod val="85000"/>
+                  </a:schemeClr>
+                </a:solidFill>
+              </a:rPr>
+              <a:t>	Paula</a:t>
+            </a:r>
+            <a:r>
+              <a:rPr lang="de-DE" dirty="0">
+                <a:solidFill>
+                  <a:schemeClr val="tx1">
+                    <a:lumMod val="85000"/>
+                  </a:schemeClr>
+                </a:solidFill>
+              </a:rPr>
+              <a:t/>
             </a:r>
             <a:br>
               <a:rPr lang="de-DE" dirty="0">
@@ -5512,7 +5564,7 @@
     </p:spTree>
     <p:extLst>
       <p:ext uri="{BB962C8B-B14F-4D97-AF65-F5344CB8AC3E}">
-        <p14:creationId xmlns:p14="http://schemas.microsoft.com/office/powerpoint/2010/main" val="2537418616"/>
+        <p14:creationId xmlns:p14="http://schemas.microsoft.com/office/powerpoint/2010/main" xmlns:p="http://schemas.openxmlformats.org/presentationml/2006/main" xmlns:r="http://schemas.openxmlformats.org/officeDocument/2006/relationships" xmlns:a="http://schemas.openxmlformats.org/drawingml/2006/main" xmlns="" val="2537418616"/>
       </p:ext>
     </p:extLst>
   </p:cSld>
@@ -6103,7 +6155,7 @@
 </file>
 
 <file path=ppt/slides/slide2.xml><?xml version="1.0" encoding="utf-8"?>
-<p:sld xmlns:a="http://schemas.openxmlformats.org/drawingml/2006/main" xmlns:r="http://schemas.openxmlformats.org/officeDocument/2006/relationships" xmlns:p="http://schemas.openxmlformats.org/presentationml/2006/main">
+<p:sld xmlns:a="http://schemas.openxmlformats.org/drawingml/2006/main" xmlns:r="http://schemas.openxmlformats.org/officeDocument/2006/relationships" xmlns:mc="http://schemas.openxmlformats.org/markup-compatibility/2006" xmlns:mv="urn:schemas-microsoft-com:mac:vml" xmlns:p="http://schemas.openxmlformats.org/presentationml/2006/main" mc:Ignorable="mv" mc:PreserveAttributes="mv:*">
   <p:cSld>
     <p:spTree>
       <p:nvGrpSpPr>
@@ -6183,7 +6235,7 @@
     </p:spTree>
     <p:extLst>
       <p:ext uri="{BB962C8B-B14F-4D97-AF65-F5344CB8AC3E}">
-        <p14:creationId xmlns:p14="http://schemas.microsoft.com/office/powerpoint/2010/main" val="1563040955"/>
+        <p14:creationId xmlns:p14="http://schemas.microsoft.com/office/powerpoint/2010/main" xmlns:p="http://schemas.openxmlformats.org/presentationml/2006/main" xmlns:r="http://schemas.openxmlformats.org/officeDocument/2006/relationships" xmlns:a="http://schemas.openxmlformats.org/drawingml/2006/main" xmlns="" val="1563040955"/>
       </p:ext>
     </p:extLst>
   </p:cSld>
@@ -6236,7 +6288,7 @@
     </a:clrScheme>
     <a:fontScheme name="Slice">
       <a:majorFont>
-        <a:latin typeface="Century Gothic" panose="020B0502020202020204"/>
+        <a:latin typeface="Century Gothic"/>
         <a:ea typeface=""/>
         <a:cs typeface=""/>
         <a:font script="Jpan" typeface="メイリオ"/>
@@ -6271,7 +6323,7 @@
         <a:font script="Geor" typeface="Sylfaen"/>
       </a:majorFont>
       <a:minorFont>
-        <a:latin typeface="Century Gothic" panose="020B0502020202020204"/>
+        <a:latin typeface="Century Gothic"/>
         <a:ea typeface=""/>
         <a:cs typeface=""/>
         <a:font script="Jpan" typeface="メイリオ"/>
@@ -6461,7 +6513,7 @@
   <a:extraClrSchemeLst/>
   <a:extLst>
     <a:ext uri="{05A4C25C-085E-4340-85A3-A5531E510DB2}">
-      <thm15:themeFamily xmlns:thm15="http://schemas.microsoft.com/office/thememl/2012/main" name="Slice" id="{0507925B-6AC9-4358-8E18-C330545D08F8}" vid="{13FEC7C6-62A9-40C4-99D2-581AACACAA2F}"/>
+      <thm15:themeFamily xmlns:thm15="http://schemas.microsoft.com/office/thememl/2012/main" xmlns:a="http://schemas.openxmlformats.org/drawingml/2006/main" xmlns="" name="Slice" id="{0507925B-6AC9-4358-8E18-C330545D08F8}" vid="{13FEC7C6-62A9-40C4-99D2-581AACACAA2F}"/>
     </a:ext>
   </a:extLst>
 </a:theme>

</xml_diff>